<commit_message>
Presentation updated with schedule and objecties
</commit_message>
<xml_diff>
--- a/presentation/Presentation_Empirical_Study_V.3.1_12-Jul-2023.pptx
+++ b/presentation/Presentation_Empirical_Study_V.3.1_12-Jul-2023.pptx
@@ -25,7 +25,9 @@
     <p:sldId id="299" r:id="rId19"/>
     <p:sldId id="283" r:id="rId20"/>
     <p:sldId id="286" r:id="rId21"/>
-    <p:sldId id="280" r:id="rId22"/>
+    <p:sldId id="307" r:id="rId22"/>
+    <p:sldId id="306" r:id="rId23"/>
+    <p:sldId id="280" r:id="rId24"/>
   </p:sldIdLst>
   <p:sldSz cx="12192000" cy="6858000"/>
   <p:notesSz cx="6858000" cy="9144000"/>
@@ -7611,7 +7613,7 @@
         <p:spPr>
           <a:xfrm>
             <a:off x="457200" y="1079157"/>
-            <a:ext cx="9304638" cy="3903313"/>
+            <a:ext cx="9304638" cy="4395755"/>
           </a:xfrm>
           <a:prstGeom prst="rect">
             <a:avLst/>
@@ -7639,8 +7641,39 @@
                 <a:latin typeface="Segoe UI" panose="020B0502040204020203" pitchFamily="34" charset="0"/>
                 <a:cs typeface="Segoe UI" panose="020B0502040204020203" pitchFamily="34" charset="0"/>
               </a:rPr>
-              <a:t>Objective</a:t>
-            </a:r>
+              <a:t>Objective </a:t>
+            </a:r>
+            <a:r>
+              <a:rPr lang="en-US" dirty="0">
+                <a:solidFill>
+                  <a:schemeClr val="accent5">
+                    <a:lumMod val="60000"/>
+                    <a:lumOff val="40000"/>
+                  </a:schemeClr>
+                </a:solidFill>
+                <a:latin typeface="Segoe UI" panose="020B0502040204020203" pitchFamily="34" charset="0"/>
+                <a:cs typeface="Segoe UI" panose="020B0502040204020203" pitchFamily="34" charset="0"/>
+                <a:sym typeface="Wingdings 3" panose="05040102010807070707" pitchFamily="18" charset="2"/>
+                <a:hlinkClick r:id="rId2" action="ppaction://hlinksldjump">
+                  <a:extLst>
+                    <a:ext uri="{A12FA001-AC4F-418D-AE19-62706E023703}">
+                      <ahyp:hlinkClr xmlns:ahyp="http://schemas.microsoft.com/office/drawing/2018/hyperlinkcolor" val="tx"/>
+                    </a:ext>
+                  </a:extLst>
+                </a:hlinkClick>
+              </a:rPr>
+              <a:t></a:t>
+            </a:r>
+            <a:endParaRPr lang="en-US" dirty="0">
+              <a:solidFill>
+                <a:schemeClr val="accent5">
+                  <a:lumMod val="60000"/>
+                  <a:lumOff val="40000"/>
+                </a:schemeClr>
+              </a:solidFill>
+              <a:latin typeface="Segoe UI" panose="020B0502040204020203" pitchFamily="34" charset="0"/>
+              <a:cs typeface="Segoe UI" panose="020B0502040204020203" pitchFamily="34" charset="0"/>
+            </a:endParaRPr>
           </a:p>
           <a:p>
             <a:pPr marL="342900" indent="-342900">
@@ -7658,8 +7691,39 @@
                 <a:latin typeface="Segoe UI" panose="020B0502040204020203" pitchFamily="34" charset="0"/>
                 <a:cs typeface="Segoe UI" panose="020B0502040204020203" pitchFamily="34" charset="0"/>
               </a:rPr>
-              <a:t>The RL environment</a:t>
-            </a:r>
+              <a:t>The RL environment </a:t>
+            </a:r>
+            <a:r>
+              <a:rPr lang="en-US" dirty="0">
+                <a:solidFill>
+                  <a:schemeClr val="accent5">
+                    <a:lumMod val="60000"/>
+                    <a:lumOff val="40000"/>
+                  </a:schemeClr>
+                </a:solidFill>
+                <a:latin typeface="Segoe UI" panose="020B0502040204020203" pitchFamily="34" charset="0"/>
+                <a:cs typeface="Segoe UI" panose="020B0502040204020203" pitchFamily="34" charset="0"/>
+                <a:sym typeface="Wingdings 3" panose="05040102010807070707" pitchFamily="18" charset="2"/>
+                <a:hlinkClick r:id="rId3" action="ppaction://hlinksldjump">
+                  <a:extLst>
+                    <a:ext uri="{A12FA001-AC4F-418D-AE19-62706E023703}">
+                      <ahyp:hlinkClr xmlns:ahyp="http://schemas.microsoft.com/office/drawing/2018/hyperlinkcolor" val="tx"/>
+                    </a:ext>
+                  </a:extLst>
+                </a:hlinkClick>
+              </a:rPr>
+              <a:t></a:t>
+            </a:r>
+            <a:endParaRPr lang="en-US" dirty="0">
+              <a:solidFill>
+                <a:schemeClr val="accent5">
+                  <a:lumMod val="60000"/>
+                  <a:lumOff val="40000"/>
+                </a:schemeClr>
+              </a:solidFill>
+              <a:latin typeface="Segoe UI" panose="020B0502040204020203" pitchFamily="34" charset="0"/>
+              <a:cs typeface="Segoe UI" panose="020B0502040204020203" pitchFamily="34" charset="0"/>
+            </a:endParaRPr>
           </a:p>
           <a:p>
             <a:pPr marL="342900" indent="-342900">
@@ -7677,8 +7741,39 @@
                 <a:latin typeface="Segoe UI" panose="020B0502040204020203" pitchFamily="34" charset="0"/>
                 <a:cs typeface="Segoe UI" panose="020B0502040204020203" pitchFamily="34" charset="0"/>
               </a:rPr>
-              <a:t>Evaluation strategy</a:t>
-            </a:r>
+              <a:t>Evaluation strategy </a:t>
+            </a:r>
+            <a:r>
+              <a:rPr lang="en-US" dirty="0">
+                <a:solidFill>
+                  <a:schemeClr val="accent5">
+                    <a:lumMod val="60000"/>
+                    <a:lumOff val="40000"/>
+                  </a:schemeClr>
+                </a:solidFill>
+                <a:latin typeface="Segoe UI" panose="020B0502040204020203" pitchFamily="34" charset="0"/>
+                <a:cs typeface="Segoe UI" panose="020B0502040204020203" pitchFamily="34" charset="0"/>
+                <a:sym typeface="Wingdings 3" panose="05040102010807070707" pitchFamily="18" charset="2"/>
+                <a:hlinkClick r:id="rId4" action="ppaction://hlinksldjump">
+                  <a:extLst>
+                    <a:ext uri="{A12FA001-AC4F-418D-AE19-62706E023703}">
+                      <ahyp:hlinkClr xmlns:ahyp="http://schemas.microsoft.com/office/drawing/2018/hyperlinkcolor" val="tx"/>
+                    </a:ext>
+                  </a:extLst>
+                </a:hlinkClick>
+              </a:rPr>
+              <a:t></a:t>
+            </a:r>
+            <a:endParaRPr lang="en-US" dirty="0">
+              <a:solidFill>
+                <a:schemeClr val="accent5">
+                  <a:lumMod val="60000"/>
+                  <a:lumOff val="40000"/>
+                </a:schemeClr>
+              </a:solidFill>
+              <a:latin typeface="Segoe UI" panose="020B0502040204020203" pitchFamily="34" charset="0"/>
+              <a:cs typeface="Segoe UI" panose="020B0502040204020203" pitchFamily="34" charset="0"/>
+            </a:endParaRPr>
           </a:p>
           <a:p>
             <a:pPr marL="342900" indent="-342900">
@@ -7696,8 +7791,39 @@
                 <a:latin typeface="Segoe UI" panose="020B0502040204020203" pitchFamily="34" charset="0"/>
                 <a:cs typeface="Segoe UI" panose="020B0502040204020203" pitchFamily="34" charset="0"/>
               </a:rPr>
-              <a:t>Findings</a:t>
-            </a:r>
+              <a:t>Findings </a:t>
+            </a:r>
+            <a:r>
+              <a:rPr lang="en-US" dirty="0">
+                <a:solidFill>
+                  <a:schemeClr val="accent5">
+                    <a:lumMod val="60000"/>
+                    <a:lumOff val="40000"/>
+                  </a:schemeClr>
+                </a:solidFill>
+                <a:latin typeface="Segoe UI" panose="020B0502040204020203" pitchFamily="34" charset="0"/>
+                <a:cs typeface="Segoe UI" panose="020B0502040204020203" pitchFamily="34" charset="0"/>
+                <a:sym typeface="Wingdings 3" panose="05040102010807070707" pitchFamily="18" charset="2"/>
+                <a:hlinkClick r:id="rId5" action="ppaction://hlinksldjump">
+                  <a:extLst>
+                    <a:ext uri="{A12FA001-AC4F-418D-AE19-62706E023703}">
+                      <ahyp:hlinkClr xmlns:ahyp="http://schemas.microsoft.com/office/drawing/2018/hyperlinkcolor" val="tx"/>
+                    </a:ext>
+                  </a:extLst>
+                </a:hlinkClick>
+              </a:rPr>
+              <a:t></a:t>
+            </a:r>
+            <a:endParaRPr lang="en-US" dirty="0">
+              <a:solidFill>
+                <a:schemeClr val="accent5">
+                  <a:lumMod val="60000"/>
+                  <a:lumOff val="40000"/>
+                </a:schemeClr>
+              </a:solidFill>
+              <a:latin typeface="Segoe UI" panose="020B0502040204020203" pitchFamily="34" charset="0"/>
+              <a:cs typeface="Segoe UI" panose="020B0502040204020203" pitchFamily="34" charset="0"/>
+            </a:endParaRPr>
           </a:p>
           <a:p>
             <a:pPr marL="342900" indent="-342900">
@@ -7715,8 +7841,89 @@
                 <a:latin typeface="Segoe UI" panose="020B0502040204020203" pitchFamily="34" charset="0"/>
                 <a:cs typeface="Segoe UI" panose="020B0502040204020203" pitchFamily="34" charset="0"/>
               </a:rPr>
-              <a:t>Discussion</a:t>
-            </a:r>
+              <a:t>Results, Plots, Tests </a:t>
+            </a:r>
+            <a:r>
+              <a:rPr lang="en-US" dirty="0">
+                <a:solidFill>
+                  <a:schemeClr val="accent5">
+                    <a:lumMod val="60000"/>
+                    <a:lumOff val="40000"/>
+                  </a:schemeClr>
+                </a:solidFill>
+                <a:latin typeface="Segoe UI" panose="020B0502040204020203" pitchFamily="34" charset="0"/>
+                <a:cs typeface="Segoe UI" panose="020B0502040204020203" pitchFamily="34" charset="0"/>
+                <a:sym typeface="Wingdings 3" panose="05040102010807070707" pitchFamily="18" charset="2"/>
+                <a:hlinkClick r:id="rId6" action="ppaction://hlinksldjump">
+                  <a:extLst>
+                    <a:ext uri="{A12FA001-AC4F-418D-AE19-62706E023703}">
+                      <ahyp:hlinkClr xmlns:ahyp="http://schemas.microsoft.com/office/drawing/2018/hyperlinkcolor" val="tx"/>
+                    </a:ext>
+                  </a:extLst>
+                </a:hlinkClick>
+              </a:rPr>
+              <a:t></a:t>
+            </a:r>
+            <a:endParaRPr lang="en-US" dirty="0">
+              <a:solidFill>
+                <a:schemeClr val="accent5">
+                  <a:lumMod val="60000"/>
+                  <a:lumOff val="40000"/>
+                </a:schemeClr>
+              </a:solidFill>
+              <a:latin typeface="Segoe UI" panose="020B0502040204020203" pitchFamily="34" charset="0"/>
+              <a:cs typeface="Segoe UI" panose="020B0502040204020203" pitchFamily="34" charset="0"/>
+            </a:endParaRPr>
+          </a:p>
+          <a:p>
+            <a:pPr marL="342900" indent="-342900">
+              <a:lnSpc>
+                <a:spcPct val="150000"/>
+              </a:lnSpc>
+              <a:spcAft>
+                <a:spcPts val="600"/>
+              </a:spcAft>
+              <a:buFont typeface="+mj-lt"/>
+              <a:buAutoNum type="arabicPeriod"/>
+            </a:pPr>
+            <a:r>
+              <a:rPr lang="en-US" dirty="0">
+                <a:latin typeface="Segoe UI" panose="020B0502040204020203" pitchFamily="34" charset="0"/>
+                <a:cs typeface="Segoe UI" panose="020B0502040204020203" pitchFamily="34" charset="0"/>
+              </a:rPr>
+              <a:t>Status of Planned Objectives and Schedule </a:t>
+            </a:r>
+            <a:r>
+              <a:rPr lang="en-US" dirty="0">
+                <a:solidFill>
+                  <a:schemeClr val="accent5">
+                    <a:lumMod val="60000"/>
+                    <a:lumOff val="40000"/>
+                  </a:schemeClr>
+                </a:solidFill>
+                <a:latin typeface="Segoe UI" panose="020B0502040204020203" pitchFamily="34" charset="0"/>
+                <a:cs typeface="Segoe UI" panose="020B0502040204020203" pitchFamily="34" charset="0"/>
+                <a:sym typeface="Wingdings 3" panose="05040102010807070707" pitchFamily="18" charset="2"/>
+                <a:hlinkClick r:id="rId7" action="ppaction://hlinksldjump">
+                  <a:extLst>
+                    <a:ext uri="{A12FA001-AC4F-418D-AE19-62706E023703}">
+                      <ahyp:hlinkClr xmlns:ahyp="http://schemas.microsoft.com/office/drawing/2018/hyperlinkcolor" val="tx"/>
+                    </a:ext>
+                  </a:extLst>
+                </a:hlinkClick>
+              </a:rPr>
+              <a:t></a:t>
+            </a:r>
+            <a:endParaRPr lang="en-US" dirty="0">
+              <a:solidFill>
+                <a:schemeClr val="accent5">
+                  <a:lumMod val="60000"/>
+                  <a:lumOff val="40000"/>
+                </a:schemeClr>
+              </a:solidFill>
+              <a:latin typeface="Segoe UI" panose="020B0502040204020203" pitchFamily="34" charset="0"/>
+              <a:cs typeface="Segoe UI" panose="020B0502040204020203" pitchFamily="34" charset="0"/>
+            </a:endParaRPr>
           </a:p>
           <a:p>
             <a:pPr marL="342900" indent="-342900">
@@ -7955,16 +8162,12 @@
               </a:lnSpc>
             </a:pPr>
             <a:r>
-              <a:rPr lang="en-US" sz="3200">
+              <a:rPr lang="en-US" sz="3200" dirty="0">
                 <a:latin typeface="Segoe UI" panose="020B0502040204020203" pitchFamily="34" charset="0"/>
                 <a:cs typeface="Segoe UI" panose="020B0502040204020203" pitchFamily="34" charset="0"/>
               </a:rPr>
               <a:t>Training plots for REINFORCE algorithm</a:t>
             </a:r>
-            <a:endParaRPr lang="en-US" sz="3200" dirty="0">
-              <a:latin typeface="Segoe UI" panose="020B0502040204020203" pitchFamily="34" charset="0"/>
-              <a:cs typeface="Segoe UI" panose="020B0502040204020203" pitchFamily="34" charset="0"/>
-            </a:endParaRPr>
           </a:p>
         </p:txBody>
       </p:sp>
@@ -8248,6 +8451,759 @@
 </file>
 
 <file path=ppt/slides/slide21.xml><?xml version="1.0" encoding="utf-8"?>
+<p:sld xmlns:a="http://schemas.openxmlformats.org/drawingml/2006/main" xmlns:r="http://schemas.openxmlformats.org/officeDocument/2006/relationships" xmlns:p="http://schemas.openxmlformats.org/presentationml/2006/main">
+  <p:cSld>
+    <p:bg>
+      <p:bgPr>
+        <a:solidFill>
+          <a:schemeClr val="bg2"/>
+        </a:solidFill>
+        <a:effectLst/>
+      </p:bgPr>
+    </p:bg>
+    <p:spTree>
+      <p:nvGrpSpPr>
+        <p:cNvPr id="1" name=""/>
+        <p:cNvGrpSpPr/>
+        <p:nvPr/>
+      </p:nvGrpSpPr>
+      <p:grpSpPr>
+        <a:xfrm>
+          <a:off x="0" y="0"/>
+          <a:ext cx="0" cy="0"/>
+          <a:chOff x="0" y="0"/>
+          <a:chExt cx="0" cy="0"/>
+        </a:xfrm>
+      </p:grpSpPr>
+      <p:sp>
+        <p:nvSpPr>
+          <p:cNvPr id="2" name="Title 1">
+            <a:extLst>
+              <a:ext uri="{FF2B5EF4-FFF2-40B4-BE49-F238E27FC236}">
+                <a16:creationId xmlns:a16="http://schemas.microsoft.com/office/drawing/2014/main" id="{8365F3F6-B96A-6D96-06E4-C7575ADEC10D}"/>
+              </a:ext>
+            </a:extLst>
+          </p:cNvPr>
+          <p:cNvSpPr>
+            <a:spLocks noGrp="1"/>
+          </p:cNvSpPr>
+          <p:nvPr>
+            <p:ph type="title"/>
+          </p:nvPr>
+        </p:nvSpPr>
+        <p:spPr/>
+        <p:txBody>
+          <a:bodyPr vert="horz" lIns="91440" tIns="45720" rIns="91440" bIns="45720" rtlCol="0" anchor="b">
+            <a:normAutofit/>
+          </a:bodyPr>
+          <a:lstStyle/>
+          <a:p>
+            <a:pPr>
+              <a:lnSpc>
+                <a:spcPct val="85000"/>
+              </a:lnSpc>
+            </a:pPr>
+            <a:r>
+              <a:rPr lang="en-US" sz="3200" dirty="0">
+                <a:latin typeface="Segoe UI" panose="020B0502040204020203" pitchFamily="34" charset="0"/>
+                <a:cs typeface="Segoe UI" panose="020B0502040204020203" pitchFamily="34" charset="0"/>
+              </a:rPr>
+              <a:t>Status of Planned Objectives and Schedule</a:t>
+            </a:r>
+          </a:p>
+        </p:txBody>
+      </p:sp>
+      <p:sp>
+        <p:nvSpPr>
+          <p:cNvPr id="3" name="Text Placeholder 2">
+            <a:extLst>
+              <a:ext uri="{FF2B5EF4-FFF2-40B4-BE49-F238E27FC236}">
+                <a16:creationId xmlns:a16="http://schemas.microsoft.com/office/drawing/2014/main" id="{18089658-D33E-47CA-0E5F-65EF95A5FDF3}"/>
+              </a:ext>
+            </a:extLst>
+          </p:cNvPr>
+          <p:cNvSpPr>
+            <a:spLocks noGrp="1"/>
+          </p:cNvSpPr>
+          <p:nvPr>
+            <p:ph type="body" idx="1"/>
+          </p:nvPr>
+        </p:nvSpPr>
+        <p:spPr/>
+        <p:txBody>
+          <a:bodyPr/>
+          <a:lstStyle/>
+          <a:p>
+            <a:endParaRPr lang="en-US"/>
+          </a:p>
+        </p:txBody>
+      </p:sp>
+    </p:spTree>
+    <p:extLst>
+      <p:ext uri="{BB962C8B-B14F-4D97-AF65-F5344CB8AC3E}">
+        <p14:creationId xmlns:p14="http://schemas.microsoft.com/office/powerpoint/2010/main" val="43060362"/>
+      </p:ext>
+    </p:extLst>
+  </p:cSld>
+  <p:clrMapOvr>
+    <a:masterClrMapping/>
+  </p:clrMapOvr>
+</p:sld>
+</file>
+
+<file path=ppt/slides/slide22.xml><?xml version="1.0" encoding="utf-8"?>
+<p:sld xmlns:a="http://schemas.openxmlformats.org/drawingml/2006/main" xmlns:r="http://schemas.openxmlformats.org/officeDocument/2006/relationships" xmlns:p="http://schemas.openxmlformats.org/presentationml/2006/main">
+  <p:cSld>
+    <p:bg>
+      <p:bgPr>
+        <a:solidFill>
+          <a:schemeClr val="bg2"/>
+        </a:solidFill>
+        <a:effectLst/>
+      </p:bgPr>
+    </p:bg>
+    <p:spTree>
+      <p:nvGrpSpPr>
+        <p:cNvPr id="1" name=""/>
+        <p:cNvGrpSpPr/>
+        <p:nvPr/>
+      </p:nvGrpSpPr>
+      <p:grpSpPr>
+        <a:xfrm>
+          <a:off x="0" y="0"/>
+          <a:ext cx="0" cy="0"/>
+          <a:chOff x="0" y="0"/>
+          <a:chExt cx="0" cy="0"/>
+        </a:xfrm>
+      </p:grpSpPr>
+      <p:sp>
+        <p:nvSpPr>
+          <p:cNvPr id="17" name="Rectangle 16">
+            <a:extLst>
+              <a:ext uri="{FF2B5EF4-FFF2-40B4-BE49-F238E27FC236}">
+                <a16:creationId xmlns:a16="http://schemas.microsoft.com/office/drawing/2014/main" id="{A6F05DDE-5F2C-44F5-BACC-DED4737B11B8}"/>
+              </a:ext>
+              <a:ext uri="{C183D7F6-B498-43B3-948B-1728B52AA6E4}">
+                <adec:decorative xmlns:adec="http://schemas.microsoft.com/office/drawing/2017/decorative" val="1"/>
+              </a:ext>
+            </a:extLst>
+          </p:cNvPr>
+          <p:cNvSpPr>
+            <a:spLocks noGrp="1" noRot="1" noChangeAspect="1" noMove="1" noResize="1" noEditPoints="1" noAdjustHandles="1" noChangeArrowheads="1" noChangeShapeType="1" noTextEdit="1"/>
+          </p:cNvSpPr>
+          <p:nvPr>
+            <p:extLst>
+              <p:ext uri="{386F3935-93C4-4BCD-93E2-E3B085C9AB24}">
+                <p16:designElem xmlns:p16="http://schemas.microsoft.com/office/powerpoint/2015/main" val="1"/>
+              </p:ext>
+            </p:extLst>
+          </p:nvPr>
+        </p:nvSpPr>
+        <p:spPr>
+          <a:xfrm>
+            <a:off x="0" y="0"/>
+            <a:ext cx="457200" cy="6858000"/>
+          </a:xfrm>
+          <a:prstGeom prst="rect">
+            <a:avLst/>
+          </a:prstGeom>
+          <a:solidFill>
+            <a:schemeClr val="accent1"/>
+          </a:solidFill>
+          <a:ln>
+            <a:noFill/>
+          </a:ln>
+        </p:spPr>
+        <p:style>
+          <a:lnRef idx="2">
+            <a:schemeClr val="accent1">
+              <a:shade val="50000"/>
+            </a:schemeClr>
+          </a:lnRef>
+          <a:fillRef idx="1">
+            <a:schemeClr val="accent1"/>
+          </a:fillRef>
+          <a:effectRef idx="0">
+            <a:schemeClr val="accent1"/>
+          </a:effectRef>
+          <a:fontRef idx="minor">
+            <a:schemeClr val="lt1"/>
+          </a:fontRef>
+        </p:style>
+      </p:sp>
+      <p:sp useBgFill="1">
+        <p:nvSpPr>
+          <p:cNvPr id="19" name="Rectangle 18">
+            <a:extLst>
+              <a:ext uri="{FF2B5EF4-FFF2-40B4-BE49-F238E27FC236}">
+                <a16:creationId xmlns:a16="http://schemas.microsoft.com/office/drawing/2014/main" id="{B6BC6A0D-8979-47FF-B606-70528EF8E548}"/>
+              </a:ext>
+              <a:ext uri="{C183D7F6-B498-43B3-948B-1728B52AA6E4}">
+                <adec:decorative xmlns:adec="http://schemas.microsoft.com/office/drawing/2017/decorative" val="1"/>
+              </a:ext>
+            </a:extLst>
+          </p:cNvPr>
+          <p:cNvSpPr>
+            <a:spLocks noGrp="1" noRot="1" noChangeAspect="1" noMove="1" noResize="1" noEditPoints="1" noAdjustHandles="1" noChangeArrowheads="1" noChangeShapeType="1" noTextEdit="1"/>
+          </p:cNvSpPr>
+          <p:nvPr>
+            <p:extLst>
+              <p:ext uri="{386F3935-93C4-4BCD-93E2-E3B085C9AB24}">
+                <p16:designElem xmlns:p16="http://schemas.microsoft.com/office/powerpoint/2015/main" val="1"/>
+              </p:ext>
+            </p:extLst>
+          </p:nvPr>
+        </p:nvSpPr>
+        <p:spPr>
+          <a:xfrm>
+            <a:off x="0" y="0"/>
+            <a:ext cx="12192000" cy="6858000"/>
+          </a:xfrm>
+          <a:prstGeom prst="rect">
+            <a:avLst/>
+          </a:prstGeom>
+          <a:ln>
+            <a:noFill/>
+          </a:ln>
+        </p:spPr>
+        <p:style>
+          <a:lnRef idx="2">
+            <a:schemeClr val="accent1">
+              <a:shade val="50000"/>
+            </a:schemeClr>
+          </a:lnRef>
+          <a:fillRef idx="1">
+            <a:schemeClr val="accent1"/>
+          </a:fillRef>
+          <a:effectRef idx="0">
+            <a:schemeClr val="accent1"/>
+          </a:effectRef>
+          <a:fontRef idx="minor">
+            <a:schemeClr val="lt1"/>
+          </a:fontRef>
+        </p:style>
+        <p:txBody>
+          <a:bodyPr rtlCol="0" anchor="ctr"/>
+          <a:lstStyle/>
+          <a:p>
+            <a:pPr algn="ctr"/>
+            <a:endParaRPr lang="en-US"/>
+          </a:p>
+        </p:txBody>
+      </p:sp>
+      <p:sp>
+        <p:nvSpPr>
+          <p:cNvPr id="21" name="Rectangle 20">
+            <a:extLst>
+              <a:ext uri="{FF2B5EF4-FFF2-40B4-BE49-F238E27FC236}">
+                <a16:creationId xmlns:a16="http://schemas.microsoft.com/office/drawing/2014/main" id="{3B92CCBF-1641-4D35-9B74-6E4981730FF5}"/>
+              </a:ext>
+              <a:ext uri="{C183D7F6-B498-43B3-948B-1728B52AA6E4}">
+                <adec:decorative xmlns:adec="http://schemas.microsoft.com/office/drawing/2017/decorative" val="1"/>
+              </a:ext>
+            </a:extLst>
+          </p:cNvPr>
+          <p:cNvSpPr>
+            <a:spLocks noGrp="1" noRot="1" noChangeAspect="1" noMove="1" noResize="1" noEditPoints="1" noAdjustHandles="1" noChangeArrowheads="1" noChangeShapeType="1" noTextEdit="1"/>
+          </p:cNvSpPr>
+          <p:nvPr>
+            <p:extLst>
+              <p:ext uri="{386F3935-93C4-4BCD-93E2-E3B085C9AB24}">
+                <p16:designElem xmlns:p16="http://schemas.microsoft.com/office/powerpoint/2015/main" val="1"/>
+              </p:ext>
+            </p:extLst>
+          </p:nvPr>
+        </p:nvSpPr>
+        <p:spPr>
+          <a:xfrm>
+            <a:off x="0" y="0"/>
+            <a:ext cx="457200" cy="6858000"/>
+          </a:xfrm>
+          <a:prstGeom prst="rect">
+            <a:avLst/>
+          </a:prstGeom>
+          <a:solidFill>
+            <a:schemeClr val="accent1"/>
+          </a:solidFill>
+          <a:ln>
+            <a:noFill/>
+          </a:ln>
+        </p:spPr>
+        <p:style>
+          <a:lnRef idx="2">
+            <a:schemeClr val="accent1">
+              <a:shade val="50000"/>
+            </a:schemeClr>
+          </a:lnRef>
+          <a:fillRef idx="1">
+            <a:schemeClr val="accent1"/>
+          </a:fillRef>
+          <a:effectRef idx="0">
+            <a:schemeClr val="accent1"/>
+          </a:effectRef>
+          <a:fontRef idx="minor">
+            <a:schemeClr val="lt1"/>
+          </a:fontRef>
+        </p:style>
+      </p:sp>
+      <p:sp>
+        <p:nvSpPr>
+          <p:cNvPr id="10" name="TextBox 9">
+            <a:extLst>
+              <a:ext uri="{FF2B5EF4-FFF2-40B4-BE49-F238E27FC236}">
+                <a16:creationId xmlns:a16="http://schemas.microsoft.com/office/drawing/2014/main" id="{96269A52-B9DD-9207-9340-EDD8C2F749BC}"/>
+              </a:ext>
+            </a:extLst>
+          </p:cNvPr>
+          <p:cNvSpPr txBox="1"/>
+          <p:nvPr/>
+        </p:nvSpPr>
+        <p:spPr>
+          <a:xfrm>
+            <a:off x="8762338" y="955763"/>
+            <a:ext cx="3029448" cy="4904099"/>
+          </a:xfrm>
+          <a:prstGeom prst="rect">
+            <a:avLst/>
+          </a:prstGeom>
+          <a:noFill/>
+        </p:spPr>
+        <p:txBody>
+          <a:bodyPr wrap="square">
+            <a:spAutoFit/>
+          </a:bodyPr>
+          <a:lstStyle/>
+          <a:p>
+            <a:pPr algn="l">
+              <a:lnSpc>
+                <a:spcPct val="120000"/>
+              </a:lnSpc>
+              <a:spcAft>
+                <a:spcPts val="600"/>
+              </a:spcAft>
+            </a:pPr>
+            <a:r>
+              <a:rPr lang="en-US" sz="1400" b="1" i="0" u="none" strike="noStrike" baseline="0" dirty="0">
+                <a:latin typeface="Calibri" panose="020F0502020204030204" pitchFamily="34" charset="0"/>
+                <a:cs typeface="Calibri" panose="020F0502020204030204" pitchFamily="34" charset="0"/>
+              </a:rPr>
+              <a:t>OBJECTIVES</a:t>
+            </a:r>
+            <a:r>
+              <a:rPr lang="en-US" sz="1400" b="0" i="0" u="none" strike="noStrike" baseline="0" dirty="0">
+                <a:latin typeface="Calibri" panose="020F0502020204030204" pitchFamily="34" charset="0"/>
+                <a:cs typeface="Calibri" panose="020F0502020204030204" pitchFamily="34" charset="0"/>
+              </a:rPr>
+              <a:t>:</a:t>
+            </a:r>
+          </a:p>
+          <a:p>
+            <a:pPr marL="228600" indent="-228600" algn="l">
+              <a:lnSpc>
+                <a:spcPct val="120000"/>
+              </a:lnSpc>
+              <a:spcAft>
+                <a:spcPts val="600"/>
+              </a:spcAft>
+              <a:buFont typeface="+mj-lt"/>
+              <a:buAutoNum type="arabicPeriod"/>
+            </a:pPr>
+            <a:r>
+              <a:rPr lang="en-US" sz="1400" b="0" i="0" u="none" strike="noStrike" baseline="0" dirty="0">
+                <a:solidFill>
+                  <a:srgbClr val="0000FF"/>
+                </a:solidFill>
+                <a:latin typeface="Calibri" panose="020F0502020204030204" pitchFamily="34" charset="0"/>
+                <a:cs typeface="Calibri" panose="020F0502020204030204" pitchFamily="34" charset="0"/>
+              </a:rPr>
+              <a:t>Evaluate</a:t>
+            </a:r>
+            <a:r>
+              <a:rPr lang="en-US" sz="1400" b="0" i="0" u="none" strike="noStrike" baseline="0" dirty="0">
+                <a:latin typeface="Calibri" panose="020F0502020204030204" pitchFamily="34" charset="0"/>
+                <a:cs typeface="Calibri" panose="020F0502020204030204" pitchFamily="34" charset="0"/>
+              </a:rPr>
+              <a:t> various RL algorithms suitable for solving predictive maintenance (</a:t>
+            </a:r>
+            <a:r>
+              <a:rPr lang="en-US" sz="1400" b="0" i="0" u="none" strike="noStrike" baseline="0" dirty="0" err="1">
+                <a:latin typeface="Calibri" panose="020F0502020204030204" pitchFamily="34" charset="0"/>
+                <a:cs typeface="Calibri" panose="020F0502020204030204" pitchFamily="34" charset="0"/>
+              </a:rPr>
+              <a:t>PdM</a:t>
+            </a:r>
+            <a:r>
+              <a:rPr lang="en-US" sz="1400" b="0" i="0" u="none" strike="noStrike" baseline="0" dirty="0">
+                <a:latin typeface="Calibri" panose="020F0502020204030204" pitchFamily="34" charset="0"/>
+                <a:cs typeface="Calibri" panose="020F0502020204030204" pitchFamily="34" charset="0"/>
+              </a:rPr>
+              <a:t>)</a:t>
+            </a:r>
+          </a:p>
+          <a:p>
+            <a:pPr marL="228600" indent="-228600" algn="l">
+              <a:lnSpc>
+                <a:spcPct val="120000"/>
+              </a:lnSpc>
+              <a:spcAft>
+                <a:spcPts val="600"/>
+              </a:spcAft>
+              <a:buFont typeface="+mj-lt"/>
+              <a:buAutoNum type="arabicPeriod"/>
+            </a:pPr>
+            <a:r>
+              <a:rPr lang="en-US" sz="1400" b="0" i="0" u="none" strike="noStrike" baseline="0" dirty="0">
+                <a:solidFill>
+                  <a:srgbClr val="0000FF"/>
+                </a:solidFill>
+                <a:latin typeface="Calibri" panose="020F0502020204030204" pitchFamily="34" charset="0"/>
+                <a:cs typeface="Calibri" panose="020F0502020204030204" pitchFamily="34" charset="0"/>
+              </a:rPr>
+              <a:t>Design and develop </a:t>
+            </a:r>
+            <a:r>
+              <a:rPr lang="en-US" sz="1400" b="0" i="0" u="none" strike="noStrike" baseline="0" dirty="0">
+                <a:latin typeface="Calibri" panose="020F0502020204030204" pitchFamily="34" charset="0"/>
+                <a:cs typeface="Calibri" panose="020F0502020204030204" pitchFamily="34" charset="0"/>
+              </a:rPr>
+              <a:t>a </a:t>
+            </a:r>
+            <a:r>
+              <a:rPr lang="en-US" sz="1400" b="0" i="0" u="none" strike="noStrike" baseline="0" dirty="0" err="1">
+                <a:latin typeface="Calibri" panose="020F0502020204030204" pitchFamily="34" charset="0"/>
+                <a:cs typeface="Calibri" panose="020F0502020204030204" pitchFamily="34" charset="0"/>
+              </a:rPr>
+              <a:t>PdM</a:t>
+            </a:r>
+            <a:r>
+              <a:rPr lang="en-US" sz="1400" b="0" i="0" u="none" strike="noStrike" baseline="0" dirty="0">
+                <a:latin typeface="Calibri" panose="020F0502020204030204" pitchFamily="34" charset="0"/>
+                <a:cs typeface="Calibri" panose="020F0502020204030204" pitchFamily="34" charset="0"/>
+              </a:rPr>
+              <a:t> application with above recommendation.</a:t>
+            </a:r>
+          </a:p>
+          <a:p>
+            <a:pPr marL="228600" indent="-228600" algn="l">
+              <a:lnSpc>
+                <a:spcPct val="120000"/>
+              </a:lnSpc>
+              <a:spcAft>
+                <a:spcPts val="600"/>
+              </a:spcAft>
+              <a:buFont typeface="+mj-lt"/>
+              <a:buAutoNum type="arabicPeriod"/>
+            </a:pPr>
+            <a:r>
+              <a:rPr lang="en-US" sz="1400" b="0" i="0" u="none" strike="noStrike" baseline="0" dirty="0">
+                <a:latin typeface="Calibri" panose="020F0502020204030204" pitchFamily="34" charset="0"/>
+                <a:cs typeface="Calibri" panose="020F0502020204030204" pitchFamily="34" charset="0"/>
+              </a:rPr>
+              <a:t>Extract features and explore techniques for </a:t>
+            </a:r>
+            <a:r>
+              <a:rPr lang="en-US" sz="1400" b="0" i="0" u="none" strike="noStrike" baseline="0" dirty="0">
+                <a:solidFill>
+                  <a:srgbClr val="0000FF"/>
+                </a:solidFill>
+                <a:latin typeface="Calibri" panose="020F0502020204030204" pitchFamily="34" charset="0"/>
+                <a:cs typeface="Calibri" panose="020F0502020204030204" pitchFamily="34" charset="0"/>
+              </a:rPr>
+              <a:t>standardizing</a:t>
+            </a:r>
+            <a:r>
+              <a:rPr lang="en-US" sz="1400" b="0" i="0" u="none" strike="noStrike" baseline="0" dirty="0">
+                <a:latin typeface="Calibri" panose="020F0502020204030204" pitchFamily="34" charset="0"/>
+                <a:cs typeface="Calibri" panose="020F0502020204030204" pitchFamily="34" charset="0"/>
+              </a:rPr>
+              <a:t> the </a:t>
+            </a:r>
+            <a:r>
+              <a:rPr lang="en-US" sz="1400" b="0" i="0" u="none" strike="noStrike" baseline="0" dirty="0">
+                <a:solidFill>
+                  <a:srgbClr val="0000FF"/>
+                </a:solidFill>
+                <a:latin typeface="Calibri" panose="020F0502020204030204" pitchFamily="34" charset="0"/>
+                <a:cs typeface="Calibri" panose="020F0502020204030204" pitchFamily="34" charset="0"/>
+              </a:rPr>
+              <a:t>features</a:t>
+            </a:r>
+            <a:r>
+              <a:rPr lang="en-US" sz="1400" b="0" i="0" u="none" strike="noStrike" baseline="0" dirty="0">
+                <a:latin typeface="Calibri" panose="020F0502020204030204" pitchFamily="34" charset="0"/>
+                <a:cs typeface="Calibri" panose="020F0502020204030204" pitchFamily="34" charset="0"/>
+              </a:rPr>
+              <a:t> across various applications.</a:t>
+            </a:r>
+          </a:p>
+          <a:p>
+            <a:pPr marL="228600" indent="-228600" algn="l">
+              <a:lnSpc>
+                <a:spcPct val="120000"/>
+              </a:lnSpc>
+              <a:spcAft>
+                <a:spcPts val="600"/>
+              </a:spcAft>
+              <a:buFont typeface="+mj-lt"/>
+              <a:buAutoNum type="arabicPeriod"/>
+            </a:pPr>
+            <a:r>
+              <a:rPr lang="en-US" sz="1400" b="0" i="0" u="none" strike="noStrike" baseline="0" dirty="0">
+                <a:latin typeface="Calibri" panose="020F0502020204030204" pitchFamily="34" charset="0"/>
+                <a:cs typeface="Calibri" panose="020F0502020204030204" pitchFamily="34" charset="0"/>
+              </a:rPr>
+              <a:t>To develop a data-driven model on </a:t>
+            </a:r>
+            <a:r>
+              <a:rPr lang="en-US" sz="1400" b="0" i="0" u="none" strike="noStrike" baseline="0" dirty="0">
+                <a:solidFill>
+                  <a:srgbClr val="0000FF"/>
+                </a:solidFill>
+                <a:latin typeface="Calibri" panose="020F0502020204030204" pitchFamily="34" charset="0"/>
+                <a:cs typeface="Calibri" panose="020F0502020204030204" pitchFamily="34" charset="0"/>
+              </a:rPr>
+              <a:t>real world data set</a:t>
+            </a:r>
+          </a:p>
+          <a:p>
+            <a:pPr algn="l">
+              <a:lnSpc>
+                <a:spcPct val="120000"/>
+              </a:lnSpc>
+              <a:spcBef>
+                <a:spcPts val="1200"/>
+              </a:spcBef>
+              <a:spcAft>
+                <a:spcPts val="600"/>
+              </a:spcAft>
+            </a:pPr>
+            <a:r>
+              <a:rPr lang="en-US" sz="1400" b="1" dirty="0">
+                <a:latin typeface="Calibri" panose="020F0502020204030204" pitchFamily="34" charset="0"/>
+                <a:cs typeface="Calibri" panose="020F0502020204030204" pitchFamily="34" charset="0"/>
+              </a:rPr>
+              <a:t>Current status:</a:t>
+            </a:r>
+          </a:p>
+          <a:p>
+            <a:pPr marL="342900" indent="-342900" algn="l">
+              <a:lnSpc>
+                <a:spcPct val="120000"/>
+              </a:lnSpc>
+              <a:spcAft>
+                <a:spcPts val="600"/>
+              </a:spcAft>
+              <a:buFont typeface="+mj-lt"/>
+              <a:buAutoNum type="arabicPeriod"/>
+            </a:pPr>
+            <a:r>
+              <a:rPr lang="en-US" sz="1400" dirty="0">
+                <a:latin typeface="Calibri" panose="020F0502020204030204" pitchFamily="34" charset="0"/>
+                <a:cs typeface="Calibri" panose="020F0502020204030204" pitchFamily="34" charset="0"/>
+              </a:rPr>
+              <a:t>SLR paper published in Q1 journal</a:t>
+            </a:r>
+          </a:p>
+          <a:p>
+            <a:pPr marL="342900" indent="-342900" algn="l">
+              <a:lnSpc>
+                <a:spcPct val="120000"/>
+              </a:lnSpc>
+              <a:spcAft>
+                <a:spcPts val="600"/>
+              </a:spcAft>
+              <a:buFont typeface="+mj-lt"/>
+              <a:buAutoNum type="arabicPeriod"/>
+            </a:pPr>
+            <a:r>
+              <a:rPr lang="en-US" sz="1400" dirty="0">
+                <a:latin typeface="Calibri" panose="020F0502020204030204" pitchFamily="34" charset="0"/>
+                <a:cs typeface="Calibri" panose="020F0502020204030204" pitchFamily="34" charset="0"/>
+              </a:rPr>
+              <a:t>Obj. 1: Empirical study on 4 RL algorithms completed</a:t>
+            </a:r>
+            <a:endParaRPr lang="en-US" sz="1400" b="1" dirty="0">
+              <a:latin typeface="Calibri" panose="020F0502020204030204" pitchFamily="34" charset="0"/>
+              <a:cs typeface="Calibri" panose="020F0502020204030204" pitchFamily="34" charset="0"/>
+            </a:endParaRPr>
+          </a:p>
+        </p:txBody>
+      </p:sp>
+      <p:pic>
+        <p:nvPicPr>
+          <p:cNvPr id="26" name="Picture 25">
+            <a:extLst>
+              <a:ext uri="{FF2B5EF4-FFF2-40B4-BE49-F238E27FC236}">
+                <a16:creationId xmlns:a16="http://schemas.microsoft.com/office/drawing/2014/main" id="{C4CA4CFA-BB91-204C-0D43-0847B62CFE96}"/>
+              </a:ext>
+            </a:extLst>
+          </p:cNvPr>
+          <p:cNvPicPr>
+            <a:picLocks noChangeAspect="1"/>
+          </p:cNvPicPr>
+          <p:nvPr/>
+        </p:nvPicPr>
+        <p:blipFill>
+          <a:blip r:embed="rId2"/>
+          <a:stretch>
+            <a:fillRect/>
+          </a:stretch>
+        </p:blipFill>
+        <p:spPr>
+          <a:xfrm>
+            <a:off x="535126" y="955763"/>
+            <a:ext cx="8063808" cy="5190595"/>
+          </a:xfrm>
+          <a:prstGeom prst="rect">
+            <a:avLst/>
+          </a:prstGeom>
+        </p:spPr>
+      </p:pic>
+      <p:sp>
+        <p:nvSpPr>
+          <p:cNvPr id="27" name="Title 1">
+            <a:extLst>
+              <a:ext uri="{FF2B5EF4-FFF2-40B4-BE49-F238E27FC236}">
+                <a16:creationId xmlns:a16="http://schemas.microsoft.com/office/drawing/2014/main" id="{D01670D4-2D88-F571-0904-6538EE94BA45}"/>
+              </a:ext>
+            </a:extLst>
+          </p:cNvPr>
+          <p:cNvSpPr>
+            <a:spLocks noGrp="1"/>
+          </p:cNvSpPr>
+          <p:nvPr>
+            <p:ph type="title"/>
+          </p:nvPr>
+        </p:nvSpPr>
+        <p:spPr>
+          <a:xfrm>
+            <a:off x="457200" y="0"/>
+            <a:ext cx="10669424" cy="789762"/>
+          </a:xfrm>
+        </p:spPr>
+        <p:txBody>
+          <a:bodyPr vert="horz" lIns="91440" tIns="45720" rIns="91440" bIns="45720" rtlCol="0" anchor="b">
+            <a:normAutofit/>
+          </a:bodyPr>
+          <a:lstStyle/>
+          <a:p>
+            <a:pPr>
+              <a:lnSpc>
+                <a:spcPct val="85000"/>
+              </a:lnSpc>
+            </a:pPr>
+            <a:r>
+              <a:rPr lang="en-US" sz="3200" dirty="0">
+                <a:latin typeface="Segoe UI" panose="020B0502040204020203" pitchFamily="34" charset="0"/>
+                <a:cs typeface="Segoe UI" panose="020B0502040204020203" pitchFamily="34" charset="0"/>
+              </a:rPr>
+              <a:t>Planned schedule and status: </a:t>
+            </a:r>
+            <a:r>
+              <a:rPr lang="en-US" sz="3200" dirty="0">
+                <a:solidFill>
+                  <a:srgbClr val="0033CC"/>
+                </a:solidFill>
+                <a:latin typeface="Segoe UI" panose="020B0502040204020203" pitchFamily="34" charset="0"/>
+                <a:cs typeface="Segoe UI" panose="020B0502040204020203" pitchFamily="34" charset="0"/>
+              </a:rPr>
+              <a:t>12-Jul-2023</a:t>
+            </a:r>
+          </a:p>
+        </p:txBody>
+      </p:sp>
+      <p:sp>
+        <p:nvSpPr>
+          <p:cNvPr id="5" name="TextBox 4">
+            <a:extLst>
+              <a:ext uri="{FF2B5EF4-FFF2-40B4-BE49-F238E27FC236}">
+                <a16:creationId xmlns:a16="http://schemas.microsoft.com/office/drawing/2014/main" id="{3FC38E06-25D6-D068-117A-64541644395C}"/>
+              </a:ext>
+            </a:extLst>
+          </p:cNvPr>
+          <p:cNvSpPr txBox="1"/>
+          <p:nvPr/>
+        </p:nvSpPr>
+        <p:spPr>
+          <a:xfrm>
+            <a:off x="3456830" y="3221606"/>
+            <a:ext cx="439309" cy="276999"/>
+          </a:xfrm>
+          <a:prstGeom prst="rect">
+            <a:avLst/>
+          </a:prstGeom>
+          <a:noFill/>
+        </p:spPr>
+        <p:txBody>
+          <a:bodyPr wrap="square">
+            <a:spAutoFit/>
+          </a:bodyPr>
+          <a:lstStyle/>
+          <a:p>
+            <a:r>
+              <a:rPr lang="en-US" sz="1200" b="0" i="0" u="none" strike="noStrike" baseline="0" dirty="0">
+                <a:latin typeface="Calibri" panose="020F0502020204030204" pitchFamily="34" charset="0"/>
+                <a:cs typeface="Calibri" panose="020F0502020204030204" pitchFamily="34" charset="0"/>
+              </a:rPr>
+              <a:t>WIP</a:t>
+            </a:r>
+            <a:endParaRPr lang="en-US" sz="1200" dirty="0"/>
+          </a:p>
+        </p:txBody>
+      </p:sp>
+      <p:pic>
+        <p:nvPicPr>
+          <p:cNvPr id="8" name="Picture 7">
+            <a:extLst>
+              <a:ext uri="{FF2B5EF4-FFF2-40B4-BE49-F238E27FC236}">
+                <a16:creationId xmlns:a16="http://schemas.microsoft.com/office/drawing/2014/main" id="{D2885E11-4126-1F53-91BE-1EBF744B1DB2}"/>
+              </a:ext>
+            </a:extLst>
+          </p:cNvPr>
+          <p:cNvPicPr>
+            <a:picLocks noChangeAspect="1"/>
+          </p:cNvPicPr>
+          <p:nvPr/>
+        </p:nvPicPr>
+        <p:blipFill>
+          <a:blip r:embed="rId3">
+            <a:alphaModFix amt="50000"/>
+          </a:blip>
+          <a:stretch>
+            <a:fillRect/>
+          </a:stretch>
+        </p:blipFill>
+        <p:spPr>
+          <a:xfrm>
+            <a:off x="11504474" y="1381042"/>
+            <a:ext cx="304800" cy="342900"/>
+          </a:xfrm>
+          <a:prstGeom prst="rect">
+            <a:avLst/>
+          </a:prstGeom>
+          <a:ln>
+            <a:solidFill>
+              <a:schemeClr val="bg1">
+                <a:lumMod val="50000"/>
+              </a:schemeClr>
+            </a:solidFill>
+          </a:ln>
+        </p:spPr>
+      </p:pic>
+    </p:spTree>
+    <p:extLst>
+      <p:ext uri="{BB962C8B-B14F-4D97-AF65-F5344CB8AC3E}">
+        <p14:creationId xmlns:p14="http://schemas.microsoft.com/office/powerpoint/2010/main" val="3722082842"/>
+      </p:ext>
+    </p:extLst>
+  </p:cSld>
+  <p:clrMapOvr>
+    <a:masterClrMapping/>
+  </p:clrMapOvr>
+</p:sld>
+</file>
+
+<file path=ppt/slides/slide23.xml><?xml version="1.0" encoding="utf-8"?>
 <p:sld xmlns:a="http://schemas.openxmlformats.org/drawingml/2006/main" xmlns:r="http://schemas.openxmlformats.org/officeDocument/2006/relationships" xmlns:p="http://schemas.openxmlformats.org/presentationml/2006/main">
   <p:cSld>
     <p:bg>

</xml_diff>